<commit_message>
Updated Unit-3 and 4
</commit_message>
<xml_diff>
--- a/Theory Class-Notes/Unit-4 Structure and Union.pptx
+++ b/Theory Class-Notes/Unit-4 Structure and Union.pptx
@@ -297,7 +297,7 @@
           <a:p>
             <a:fld id="{61532AF1-4615-4667-912A-829B12F8C4D2}" type="datetimeFigureOut">
               <a:rPr lang="en-IN" smtClean="0"/>
-              <a:t>07-03-2025</a:t>
+              <a:t>09-02-2026</a:t>
             </a:fld>
             <a:endParaRPr lang="en-IN"/>
           </a:p>
@@ -565,6 +565,90 @@
 </p:notesMaster>
 </file>
 
+<file path=ppt/notesSlides/notesSlide1.xml><?xml version="1.0" encoding="utf-8"?>
+<p:notes xmlns:a="http://schemas.openxmlformats.org/drawingml/2006/main" xmlns:r="http://schemas.openxmlformats.org/officeDocument/2006/relationships" xmlns:p="http://schemas.openxmlformats.org/presentationml/2006/main">
+  <p:cSld>
+    <p:spTree>
+      <p:nvGrpSpPr>
+        <p:cNvPr id="1" name=""/>
+        <p:cNvGrpSpPr/>
+        <p:nvPr/>
+      </p:nvGrpSpPr>
+      <p:grpSpPr>
+        <a:xfrm>
+          <a:off x="0" y="0"/>
+          <a:ext cx="0" cy="0"/>
+          <a:chOff x="0" y="0"/>
+          <a:chExt cx="0" cy="0"/>
+        </a:xfrm>
+      </p:grpSpPr>
+      <p:sp>
+        <p:nvSpPr>
+          <p:cNvPr id="2" name="Slide Image Placeholder 1"/>
+          <p:cNvSpPr>
+            <a:spLocks noGrp="1" noRot="1" noChangeAspect="1"/>
+          </p:cNvSpPr>
+          <p:nvPr>
+            <p:ph type="sldImg"/>
+          </p:nvPr>
+        </p:nvSpPr>
+        <p:spPr/>
+      </p:sp>
+      <p:sp>
+        <p:nvSpPr>
+          <p:cNvPr id="3" name="Notes Placeholder 2"/>
+          <p:cNvSpPr>
+            <a:spLocks noGrp="1"/>
+          </p:cNvSpPr>
+          <p:nvPr>
+            <p:ph type="body" idx="1"/>
+          </p:nvPr>
+        </p:nvSpPr>
+        <p:spPr/>
+        <p:txBody>
+          <a:bodyPr/>
+          <a:lstStyle/>
+          <a:p>
+            <a:endParaRPr lang="en-IN" dirty="0"/>
+          </a:p>
+        </p:txBody>
+      </p:sp>
+      <p:sp>
+        <p:nvSpPr>
+          <p:cNvPr id="4" name="Slide Number Placeholder 3"/>
+          <p:cNvSpPr>
+            <a:spLocks noGrp="1"/>
+          </p:cNvSpPr>
+          <p:nvPr>
+            <p:ph type="sldNum" sz="quarter" idx="5"/>
+          </p:nvPr>
+        </p:nvSpPr>
+        <p:spPr/>
+        <p:txBody>
+          <a:bodyPr/>
+          <a:lstStyle/>
+          <a:p>
+            <a:fld id="{6638A8E6-D4B7-4286-B37C-5D755B8E2CFC}" type="slidenum">
+              <a:rPr lang="en-IN" smtClean="0"/>
+              <a:t>16</a:t>
+            </a:fld>
+            <a:endParaRPr lang="en-IN"/>
+          </a:p>
+        </p:txBody>
+      </p:sp>
+    </p:spTree>
+    <p:extLst>
+      <p:ext uri="{BB962C8B-B14F-4D97-AF65-F5344CB8AC3E}">
+        <p14:creationId xmlns:p14="http://schemas.microsoft.com/office/powerpoint/2010/main" val="3076260216"/>
+      </p:ext>
+    </p:extLst>
+  </p:cSld>
+  <p:clrMapOvr>
+    <a:masterClrMapping/>
+  </p:clrMapOvr>
+</p:notes>
+</file>
+
 <file path=ppt/slideLayouts/slideLayout1.xml><?xml version="1.0" encoding="utf-8"?>
 <p:sldLayout xmlns:a="http://schemas.openxmlformats.org/drawingml/2006/main" xmlns:r="http://schemas.openxmlformats.org/officeDocument/2006/relationships" xmlns:p="http://schemas.openxmlformats.org/presentationml/2006/main" type="title" preserve="1">
   <p:cSld name="Title Slide">
@@ -714,7 +798,7 @@
           <a:p>
             <a:fld id="{C43A76A3-ADC8-4477-8FC1-B9DD55D84908}" type="datetime1">
               <a:rPr lang="en-US" smtClean="0"/>
-              <a:t>3/7/2025</a:t>
+              <a:t>2/9/2026</a:t>
             </a:fld>
             <a:endParaRPr lang="en-US" dirty="0"/>
           </a:p>
@@ -912,7 +996,7 @@
           <a:p>
             <a:fld id="{D6762538-DC4D-4667-96E5-B3278DDF8B12}" type="datetime1">
               <a:rPr lang="en-US" smtClean="0"/>
-              <a:t>3/7/2025</a:t>
+              <a:t>2/9/2026</a:t>
             </a:fld>
             <a:endParaRPr lang="en-US"/>
           </a:p>
@@ -1120,7 +1204,7 @@
           <a:p>
             <a:fld id="{05880548-5C08-4BE3-B63E-F2BB63B0B00C}" type="datetime1">
               <a:rPr lang="en-US" smtClean="0"/>
-              <a:t>3/7/2025</a:t>
+              <a:t>2/9/2026</a:t>
             </a:fld>
             <a:endParaRPr lang="en-US"/>
           </a:p>
@@ -1318,7 +1402,7 @@
           <a:p>
             <a:fld id="{DE7F49BE-398D-479A-8A7E-5DDBCA61EDCB}" type="datetime1">
               <a:rPr lang="en-US" smtClean="0"/>
-              <a:t>3/7/2025</a:t>
+              <a:t>2/9/2026</a:t>
             </a:fld>
             <a:endParaRPr lang="en-US" dirty="0"/>
           </a:p>
@@ -1594,7 +1678,7 @@
           <a:p>
             <a:fld id="{CCD0C193-4974-4A1F-9C63-07D595E30D66}" type="datetime1">
               <a:rPr lang="en-US" smtClean="0"/>
-              <a:t>3/7/2025</a:t>
+              <a:t>2/9/2026</a:t>
             </a:fld>
             <a:endParaRPr lang="en-US"/>
           </a:p>
@@ -1861,7 +1945,7 @@
           <a:p>
             <a:fld id="{701AA87F-28D4-4BF0-B81F-877A89DFD5AC}" type="datetime1">
               <a:rPr lang="en-US" smtClean="0"/>
-              <a:t>3/7/2025</a:t>
+              <a:t>2/9/2026</a:t>
             </a:fld>
             <a:endParaRPr lang="en-US"/>
           </a:p>
@@ -2275,7 +2359,7 @@
           <a:p>
             <a:fld id="{A8A9F1F3-208B-49A3-B337-9C8ACEB3E0E1}" type="datetime1">
               <a:rPr lang="en-US" smtClean="0"/>
-              <a:t>3/7/2025</a:t>
+              <a:t>2/9/2026</a:t>
             </a:fld>
             <a:endParaRPr lang="en-US"/>
           </a:p>
@@ -2422,7 +2506,7 @@
           <a:p>
             <a:fld id="{27AF6CA6-7293-4AA2-A0E0-A3BF4416E786}" type="datetime1">
               <a:rPr lang="en-US" smtClean="0"/>
-              <a:t>3/7/2025</a:t>
+              <a:t>2/9/2026</a:t>
             </a:fld>
             <a:endParaRPr lang="en-US"/>
           </a:p>
@@ -2535,7 +2619,7 @@
           <a:p>
             <a:fld id="{98D87016-7BCD-46FB-8EE3-AB6C369108B4}" type="datetime1">
               <a:rPr lang="en-US" smtClean="0"/>
-              <a:t>3/7/2025</a:t>
+              <a:t>2/9/2026</a:t>
             </a:fld>
             <a:endParaRPr lang="en-US"/>
           </a:p>
@@ -2854,7 +2938,7 @@
           <a:p>
             <a:fld id="{A1547011-1FFC-4EF8-9A2E-53B4AD2ADBD4}" type="datetime1">
               <a:rPr lang="en-US" smtClean="0"/>
-              <a:t>3/7/2025</a:t>
+              <a:t>2/9/2026</a:t>
             </a:fld>
             <a:endParaRPr lang="en-US"/>
           </a:p>
@@ -3149,7 +3233,7 @@
           <a:p>
             <a:fld id="{9562EB47-45B4-4EF5-A743-B4885DD2F060}" type="datetime1">
               <a:rPr lang="en-US" smtClean="0"/>
-              <a:t>3/7/2025</a:t>
+              <a:t>2/9/2026</a:t>
             </a:fld>
             <a:endParaRPr lang="en-US"/>
           </a:p>
@@ -4534,7 +4618,7 @@
           <a:p>
             <a:fld id="{4A8D24A4-5FEC-4062-8995-EB21925B3B40}" type="datetime1">
               <a:rPr lang="en-US" smtClean="0"/>
-              <a:t>3/7/2025</a:t>
+              <a:t>2/9/2026</a:t>
             </a:fld>
             <a:endParaRPr lang="en-US" sz="1000" dirty="0"/>
           </a:p>
@@ -6620,7 +6704,7 @@
           <p:nvPr/>
         </p:nvPicPr>
         <p:blipFill>
-          <a:blip r:embed="rId2"/>
+          <a:blip r:embed="rId3"/>
           <a:stretch>
             <a:fillRect/>
           </a:stretch>
@@ -7341,8 +7425,8 @@
         </p:blipFill>
         <p:spPr>
           <a:xfrm>
-            <a:off x="10795" y="1625540"/>
-            <a:ext cx="12192000" cy="3911719"/>
+            <a:off x="152527" y="1603816"/>
+            <a:ext cx="15677735" cy="5030093"/>
           </a:xfrm>
           <a:prstGeom prst="rect">
             <a:avLst/>
@@ -9494,7 +9578,7 @@
         </p:blipFill>
         <p:spPr>
           <a:xfrm>
-            <a:off x="0" y="0"/>
+            <a:off x="824459" y="0"/>
             <a:ext cx="7143750" cy="6858000"/>
           </a:xfrm>
           <a:prstGeom prst="rect">
@@ -9604,7 +9688,7 @@
         </p:blipFill>
         <p:spPr>
           <a:xfrm>
-            <a:off x="-87086" y="0"/>
+            <a:off x="662422" y="0"/>
             <a:ext cx="6373211" cy="6858000"/>
           </a:xfrm>
           <a:prstGeom prst="rect">
@@ -9973,12 +10057,9 @@
             </a:r>
           </a:p>
           <a:p>
-            <a:pPr marL="0" indent="0">
-              <a:buNone/>
-            </a:pPr>
             <a:r>
               <a:rPr lang="en-US" sz="2800" dirty="0"/>
-              <a:t>✅ Returns </a:t>
+              <a:t>Returns </a:t>
             </a:r>
             <a:r>
               <a:rPr lang="en-US" sz="2800" b="1" dirty="0">
@@ -9994,12 +10075,9 @@
             </a:r>
           </a:p>
           <a:p>
-            <a:pPr marL="0" indent="0">
-              <a:buNone/>
-            </a:pPr>
             <a:r>
               <a:rPr lang="en-US" sz="2800" dirty="0"/>
-              <a:t>✅ If allocation </a:t>
+              <a:t>If allocation </a:t>
             </a:r>
             <a:r>
               <a:rPr lang="en-US" sz="2800" b="1" dirty="0">
@@ -10027,12 +10105,9 @@
             </a:r>
           </a:p>
           <a:p>
-            <a:pPr marL="0" indent="0">
-              <a:buNone/>
-            </a:pPr>
             <a:r>
               <a:rPr lang="en-US" sz="2800" dirty="0"/>
-              <a:t>✅ The allocated memory contains </a:t>
+              <a:t>The allocated memory contains </a:t>
             </a:r>
             <a:r>
               <a:rPr lang="en-US" sz="2800" b="1" dirty="0">
@@ -10068,12 +10143,9 @@
             </a:r>
           </a:p>
           <a:p>
-            <a:pPr marL="0" indent="0">
-              <a:buNone/>
-            </a:pPr>
             <a:r>
               <a:rPr lang="en-US" sz="2800" dirty="0"/>
-              <a:t>✅ Memory allocated with malloc() must be freed using </a:t>
+              <a:t>Memory allocated with malloc() must be freed using </a:t>
             </a:r>
             <a:r>
               <a:rPr lang="en-US" sz="2800" b="1" dirty="0">
@@ -11265,7 +11337,7 @@
         </p:blipFill>
         <p:spPr>
           <a:xfrm>
-            <a:off x="-1" y="0"/>
+            <a:off x="424544" y="-7320"/>
             <a:ext cx="7979229" cy="6865320"/>
           </a:xfrm>
           <a:prstGeom prst="rect">
@@ -12497,7 +12569,7 @@
         </p:blipFill>
         <p:spPr>
           <a:xfrm>
-            <a:off x="-32658" y="0"/>
+            <a:off x="1023257" y="0"/>
             <a:ext cx="6183086" cy="6971125"/>
           </a:xfrm>
           <a:prstGeom prst="rect">

</xml_diff>